<commit_message>
final page in pptx added
</commit_message>
<xml_diff>
--- a/SecondSeminar.pptx
+++ b/SecondSeminar.pptx
@@ -108,6 +108,11 @@
       </a:defRPr>
     </a:lvl9pPr>
   </p:defaultTextStyle>
+  <p:extLst>
+    <p:ext uri="{EFAFB233-063F-42B5-8137-9DF3F51BA10A}">
+      <p15:sldGuideLst xmlns:p15="http://schemas.microsoft.com/office/powerpoint/2012/main"/>
+    </p:ext>
+  </p:extLst>
 </p:presentation>
 </file>
 
@@ -6275,10 +6280,10 @@
       </p:grpSpPr>
       <p:sp>
         <p:nvSpPr>
-          <p:cNvPr id="5" name="Заголовок 4">
+          <p:cNvPr id="2" name="Заголовок 1">
             <a:extLst>
               <a:ext uri="{FF2B5EF4-FFF2-40B4-BE49-F238E27FC236}">
-                <a16:creationId xmlns:a16="http://schemas.microsoft.com/office/drawing/2014/main" id="{7A5BE084-8267-45F6-AC93-1194D545345C}"/>
+                <a16:creationId xmlns:a16="http://schemas.microsoft.com/office/drawing/2014/main" id="{9999A8C8-0836-4FF4-86A5-E2107A599FDA}"/>
               </a:ext>
             </a:extLst>
           </p:cNvPr>
@@ -6289,37 +6294,104 @@
             <p:ph type="title"/>
           </p:nvPr>
         </p:nvSpPr>
-        <p:spPr/>
-        <p:txBody>
-          <a:bodyPr/>
-          <a:lstStyle/>
-          <a:p>
-            <a:endParaRPr lang="ru-RU"/>
-          </a:p>
-        </p:txBody>
-      </p:sp>
-      <p:sp>
-        <p:nvSpPr>
-          <p:cNvPr id="6" name="Объект 5">
+        <p:spPr>
+          <a:xfrm>
+            <a:off x="570802" y="218016"/>
+            <a:ext cx="8795140" cy="758528"/>
+          </a:xfrm>
+        </p:spPr>
+        <p:txBody>
+          <a:bodyPr>
+            <a:normAutofit fontScale="90000"/>
+          </a:bodyPr>
+          <a:lstStyle/>
+          <a:p>
+            <a:r>
+              <a:rPr lang="ru-RU" sz="4800" dirty="0"/>
+              <a:t>ВЫВОД</a:t>
+            </a:r>
+            <a:endParaRPr lang="ru-RU" dirty="0"/>
+          </a:p>
+        </p:txBody>
+      </p:sp>
+      <p:pic>
+        <p:nvPicPr>
+          <p:cNvPr id="8" name="Объект 7">
             <a:extLst>
               <a:ext uri="{FF2B5EF4-FFF2-40B4-BE49-F238E27FC236}">
-                <a16:creationId xmlns:a16="http://schemas.microsoft.com/office/drawing/2014/main" id="{7089CDB4-85FB-4D85-96E2-7BC0D2F57F77}"/>
+                <a16:creationId xmlns:a16="http://schemas.microsoft.com/office/drawing/2014/main" id="{4E32287B-A3EB-412A-BE1A-6E2040A47982}"/>
               </a:ext>
             </a:extLst>
           </p:cNvPr>
-          <p:cNvSpPr>
-            <a:spLocks noGrp="1"/>
-          </p:cNvSpPr>
+          <p:cNvPicPr>
+            <a:picLocks noGrp="1" noChangeAspect="1"/>
+          </p:cNvPicPr>
           <p:nvPr>
             <p:ph idx="1"/>
           </p:nvPr>
-        </p:nvSpPr>
-        <p:spPr/>
+        </p:nvPicPr>
+        <p:blipFill>
+          <a:blip r:embed="rId2">
+            <a:extLst>
+              <a:ext uri="{28A0092B-C50C-407E-A947-70E740481C1C}">
+                <a14:useLocalDpi xmlns:a14="http://schemas.microsoft.com/office/drawing/2010/main" val="0"/>
+              </a:ext>
+            </a:extLst>
+          </a:blip>
+          <a:stretch>
+            <a:fillRect/>
+          </a:stretch>
+        </p:blipFill>
+        <p:spPr>
+          <a:xfrm>
+            <a:off x="1140594" y="2392393"/>
+            <a:ext cx="7062374" cy="3989288"/>
+          </a:xfrm>
+        </p:spPr>
+      </p:pic>
+      <p:sp>
+        <p:nvSpPr>
+          <p:cNvPr id="4" name="Текст 3">
+            <a:extLst>
+              <a:ext uri="{FF2B5EF4-FFF2-40B4-BE49-F238E27FC236}">
+                <a16:creationId xmlns:a16="http://schemas.microsoft.com/office/drawing/2014/main" id="{9C7C40DE-994F-4DB2-9EE8-F25B2B251E02}"/>
+              </a:ext>
+            </a:extLst>
+          </p:cNvPr>
+          <p:cNvSpPr>
+            <a:spLocks noGrp="1"/>
+          </p:cNvSpPr>
+          <p:nvPr>
+            <p:ph type="body" sz="half" idx="2"/>
+          </p:nvPr>
+        </p:nvSpPr>
+        <p:spPr>
+          <a:xfrm>
+            <a:off x="570802" y="1102981"/>
+            <a:ext cx="8573198" cy="1162975"/>
+          </a:xfrm>
+        </p:spPr>
         <p:txBody>
           <a:bodyPr/>
           <a:lstStyle/>
           <a:p>
-            <a:endParaRPr lang="ru-RU"/>
+            <a:r>
+              <a:rPr lang="ru-RU" dirty="0"/>
+              <a:t>Да здравствует консоль!.. Да здравствует прокрутка видео! Да здравствуют собственные репозитории и свободные ветки!..   </a:t>
+            </a:r>
+          </a:p>
+          <a:p>
+            <a:r>
+              <a:rPr lang="en-US" dirty="0"/>
+              <a:t>P.S.</a:t>
+            </a:r>
+            <a:r>
+              <a:rPr lang="ru-RU" dirty="0"/>
+              <a:t> И на случай, если не свидимся: добрый день, добрый вечер и доброй ночи)</a:t>
+            </a:r>
+          </a:p>
+          <a:p>
+            <a:endParaRPr lang="ru-RU" dirty="0"/>
           </a:p>
         </p:txBody>
       </p:sp>

</xml_diff>

<commit_message>
page 6 only for 4th_branch
</commit_message>
<xml_diff>
--- a/SecondSeminar.pptx
+++ b/SecondSeminar.pptx
@@ -10,6 +10,7 @@
     <p:sldId id="258" r:id="rId4"/>
     <p:sldId id="259" r:id="rId5"/>
     <p:sldId id="260" r:id="rId6"/>
+    <p:sldId id="261" r:id="rId7"/>
   </p:sldIdLst>
   <p:sldSz cx="12192000" cy="6858000"/>
   <p:notesSz cx="6858000" cy="9144000"/>
@@ -5942,7 +5943,15 @@
           <a:p>
             <a:r>
               <a:rPr lang="ru-RU" dirty="0"/>
-              <a:t>Пардон за качество, но я рада, что не была на этом собрании</a:t>
+              <a:t>Пардон за качество</a:t>
+            </a:r>
+            <a:r>
+              <a:rPr lang="en-US" dirty="0"/>
+              <a:t> </a:t>
+            </a:r>
+            <a:r>
+              <a:rPr lang="ru-RU" dirty="0"/>
+              <a:t>картинки, но я рада, что не была на этом собрании</a:t>
             </a:r>
           </a:p>
         </p:txBody>
@@ -6399,6 +6408,151 @@
     <p:extLst>
       <p:ext uri="{BB962C8B-B14F-4D97-AF65-F5344CB8AC3E}">
         <p14:creationId xmlns:p14="http://schemas.microsoft.com/office/powerpoint/2010/main" val="833738510"/>
+      </p:ext>
+    </p:extLst>
+  </p:cSld>
+  <p:clrMapOvr>
+    <a:masterClrMapping/>
+  </p:clrMapOvr>
+</p:sld>
+</file>
+
+<file path=ppt/slides/slide6.xml><?xml version="1.0" encoding="utf-8"?>
+<p:sld xmlns:a="http://schemas.openxmlformats.org/drawingml/2006/main" xmlns:r="http://schemas.openxmlformats.org/officeDocument/2006/relationships" xmlns:p="http://schemas.openxmlformats.org/presentationml/2006/main">
+  <p:cSld>
+    <p:spTree>
+      <p:nvGrpSpPr>
+        <p:cNvPr id="1" name=""/>
+        <p:cNvGrpSpPr/>
+        <p:nvPr/>
+      </p:nvGrpSpPr>
+      <p:grpSpPr>
+        <a:xfrm>
+          <a:off x="0" y="0"/>
+          <a:ext cx="0" cy="0"/>
+          <a:chOff x="0" y="0"/>
+          <a:chExt cx="0" cy="0"/>
+        </a:xfrm>
+      </p:grpSpPr>
+      <p:sp>
+        <p:nvSpPr>
+          <p:cNvPr id="5" name="Заголовок 4">
+            <a:extLst>
+              <a:ext uri="{FF2B5EF4-FFF2-40B4-BE49-F238E27FC236}">
+                <a16:creationId xmlns:a16="http://schemas.microsoft.com/office/drawing/2014/main" id="{D87F5A1A-A713-45C4-B3C8-1B0DB0B4D0B6}"/>
+              </a:ext>
+            </a:extLst>
+          </p:cNvPr>
+          <p:cNvSpPr>
+            <a:spLocks noGrp="1"/>
+          </p:cNvSpPr>
+          <p:nvPr>
+            <p:ph type="title"/>
+          </p:nvPr>
+        </p:nvSpPr>
+        <p:spPr>
+          <a:xfrm>
+            <a:off x="677333" y="435006"/>
+            <a:ext cx="8599831" cy="1136342"/>
+          </a:xfrm>
+        </p:spPr>
+        <p:txBody>
+          <a:bodyPr>
+            <a:normAutofit/>
+          </a:bodyPr>
+          <a:lstStyle/>
+          <a:p>
+            <a:r>
+              <a:rPr lang="en-US" dirty="0"/>
+              <a:t>P.P.S. </a:t>
+            </a:r>
+            <a:r>
+              <a:rPr lang="ru-RU" dirty="0"/>
+              <a:t>Как говорил мой старший брат-программист: тыкай все кнопки! Ты ничего тут не сможешь безвозвратно сломать. </a:t>
+            </a:r>
+          </a:p>
+        </p:txBody>
+      </p:sp>
+      <p:pic>
+        <p:nvPicPr>
+          <p:cNvPr id="10" name="Объект 9">
+            <a:extLst>
+              <a:ext uri="{FF2B5EF4-FFF2-40B4-BE49-F238E27FC236}">
+                <a16:creationId xmlns:a16="http://schemas.microsoft.com/office/drawing/2014/main" id="{BD9FB76E-F327-482D-8C0C-00C5F117D7B9}"/>
+              </a:ext>
+            </a:extLst>
+          </p:cNvPr>
+          <p:cNvPicPr>
+            <a:picLocks noGrp="1" noChangeAspect="1"/>
+          </p:cNvPicPr>
+          <p:nvPr>
+            <p:ph idx="1"/>
+          </p:nvPr>
+        </p:nvPicPr>
+        <p:blipFill>
+          <a:blip r:embed="rId2">
+            <a:extLst>
+              <a:ext uri="{28A0092B-C50C-407E-A947-70E740481C1C}">
+                <a14:useLocalDpi xmlns:a14="http://schemas.microsoft.com/office/drawing/2010/main" val="0"/>
+              </a:ext>
+            </a:extLst>
+          </a:blip>
+          <a:stretch>
+            <a:fillRect/>
+          </a:stretch>
+        </p:blipFill>
+        <p:spPr>
+          <a:xfrm>
+            <a:off x="3198815" y="3038653"/>
+            <a:ext cx="3432907" cy="2461330"/>
+          </a:xfrm>
+        </p:spPr>
+      </p:pic>
+      <p:sp>
+        <p:nvSpPr>
+          <p:cNvPr id="8" name="Текст 7">
+            <a:extLst>
+              <a:ext uri="{FF2B5EF4-FFF2-40B4-BE49-F238E27FC236}">
+                <a16:creationId xmlns:a16="http://schemas.microsoft.com/office/drawing/2014/main" id="{EAD715AA-896A-43E4-B2A6-635AA621C896}"/>
+              </a:ext>
+            </a:extLst>
+          </p:cNvPr>
+          <p:cNvSpPr>
+            <a:spLocks noGrp="1"/>
+          </p:cNvSpPr>
+          <p:nvPr>
+            <p:ph type="body" sz="half" idx="2"/>
+          </p:nvPr>
+        </p:nvSpPr>
+        <p:spPr>
+          <a:xfrm>
+            <a:off x="2988005" y="1936752"/>
+            <a:ext cx="3854528" cy="651931"/>
+          </a:xfrm>
+        </p:spPr>
+        <p:txBody>
+          <a:bodyPr>
+            <a:normAutofit/>
+          </a:bodyPr>
+          <a:lstStyle/>
+          <a:p>
+            <a:pPr algn="ctr"/>
+            <a:r>
+              <a:rPr lang="ru-RU" sz="1800" dirty="0"/>
+              <a:t>Очень мотивирует </a:t>
+            </a:r>
+            <a:r>
+              <a:rPr lang="en-US" sz="1800" dirty="0"/>
+              <a:t>^_^</a:t>
+            </a:r>
+            <a:endParaRPr lang="ru-RU" sz="1800" dirty="0"/>
+          </a:p>
+        </p:txBody>
+      </p:sp>
+    </p:spTree>
+    <p:extLst>
+      <p:ext uri="{BB962C8B-B14F-4D97-AF65-F5344CB8AC3E}">
+        <p14:creationId xmlns:p14="http://schemas.microsoft.com/office/powerpoint/2010/main" val="3314578910"/>
       </p:ext>
     </p:extLst>
   </p:cSld>

</xml_diff>